<commit_message>
Adds reduction, example input, and psuedo
</commit_message>
<xml_diff>
--- a/approximation_presentation.pptx
+++ b/approximation_presentation.pptx
@@ -783,7 +783,7 @@
   <p:cSld>
     <p:spTree>
       <p:nvGrpSpPr>
-        <p:cNvPr id="150" name="Shape 150"/>
+        <p:cNvPr id="151" name="Shape 151"/>
         <p:cNvGrpSpPr/>
         <p:nvPr/>
       </p:nvGrpSpPr>
@@ -797,7 +797,7 @@
       </p:grpSpPr>
       <p:sp>
         <p:nvSpPr>
-          <p:cNvPr id="151" name="Google Shape;151;g1261d56f1b4_0_10:notes"/>
+          <p:cNvPr id="152" name="Google Shape;152;g1261d56f1b4_0_10:notes"/>
           <p:cNvSpPr txBox="1"/>
           <p:nvPr>
             <p:ph idx="1" type="body"/>
@@ -836,7 +836,7 @@
       </p:sp>
       <p:sp>
         <p:nvSpPr>
-          <p:cNvPr id="152" name="Google Shape;152;g1261d56f1b4_0_10:notes"/>
+          <p:cNvPr id="153" name="Google Shape;153;g1261d56f1b4_0_10:notes"/>
           <p:cNvSpPr/>
           <p:nvPr>
             <p:ph idx="2" type="sldImg"/>
@@ -1278,7 +1278,7 @@
   <p:cSld>
     <p:spTree>
       <p:nvGrpSpPr>
-        <p:cNvPr id="120" name="Shape 120"/>
+        <p:cNvPr id="121" name="Shape 121"/>
         <p:cNvGrpSpPr/>
         <p:nvPr/>
       </p:nvGrpSpPr>
@@ -1292,7 +1292,7 @@
       </p:grpSpPr>
       <p:sp>
         <p:nvSpPr>
-          <p:cNvPr id="121" name="Google Shape;121;p6:notes"/>
+          <p:cNvPr id="122" name="Google Shape;122;p6:notes"/>
           <p:cNvSpPr txBox="1"/>
           <p:nvPr>
             <p:ph idx="1" type="body"/>
@@ -1331,7 +1331,7 @@
       </p:sp>
       <p:sp>
         <p:nvSpPr>
-          <p:cNvPr id="122" name="Google Shape;122;p6:notes"/>
+          <p:cNvPr id="123" name="Google Shape;123;p6:notes"/>
           <p:cNvSpPr/>
           <p:nvPr>
             <p:ph idx="2" type="sldImg"/>
@@ -1377,7 +1377,7 @@
   <p:cSld>
     <p:spTree>
       <p:nvGrpSpPr>
-        <p:cNvPr id="127" name="Shape 127"/>
+        <p:cNvPr id="128" name="Shape 128"/>
         <p:cNvGrpSpPr/>
         <p:nvPr/>
       </p:nvGrpSpPr>
@@ -1391,7 +1391,7 @@
       </p:grpSpPr>
       <p:sp>
         <p:nvSpPr>
-          <p:cNvPr id="128" name="Google Shape;128;p7:notes"/>
+          <p:cNvPr id="129" name="Google Shape;129;p7:notes"/>
           <p:cNvSpPr txBox="1"/>
           <p:nvPr>
             <p:ph idx="1" type="body"/>
@@ -1430,7 +1430,7 @@
       </p:sp>
       <p:sp>
         <p:nvSpPr>
-          <p:cNvPr id="129" name="Google Shape;129;p7:notes"/>
+          <p:cNvPr id="130" name="Google Shape;130;p7:notes"/>
           <p:cNvSpPr/>
           <p:nvPr>
             <p:ph idx="2" type="sldImg"/>
@@ -1476,7 +1476,7 @@
   <p:cSld>
     <p:spTree>
       <p:nvGrpSpPr>
-        <p:cNvPr id="135" name="Shape 135"/>
+        <p:cNvPr id="136" name="Shape 136"/>
         <p:cNvGrpSpPr/>
         <p:nvPr/>
       </p:nvGrpSpPr>
@@ -1490,7 +1490,7 @@
       </p:grpSpPr>
       <p:sp>
         <p:nvSpPr>
-          <p:cNvPr id="136" name="Google Shape;136;p8:notes"/>
+          <p:cNvPr id="137" name="Google Shape;137;p8:notes"/>
           <p:cNvSpPr txBox="1"/>
           <p:nvPr>
             <p:ph idx="1" type="body"/>
@@ -1529,7 +1529,7 @@
       </p:sp>
       <p:sp>
         <p:nvSpPr>
-          <p:cNvPr id="137" name="Google Shape;137;p8:notes"/>
+          <p:cNvPr id="138" name="Google Shape;138;p8:notes"/>
           <p:cNvSpPr/>
           <p:nvPr>
             <p:ph idx="2" type="sldImg"/>
@@ -1575,7 +1575,7 @@
   <p:cSld>
     <p:spTree>
       <p:nvGrpSpPr>
-        <p:cNvPr id="141" name="Shape 141"/>
+        <p:cNvPr id="142" name="Shape 142"/>
         <p:cNvGrpSpPr/>
         <p:nvPr/>
       </p:nvGrpSpPr>
@@ -1589,7 +1589,7 @@
       </p:grpSpPr>
       <p:sp>
         <p:nvSpPr>
-          <p:cNvPr id="142" name="Google Shape;142;p9:notes"/>
+          <p:cNvPr id="143" name="Google Shape;143;p9:notes"/>
           <p:cNvSpPr txBox="1"/>
           <p:nvPr>
             <p:ph idx="1" type="body"/>
@@ -1628,7 +1628,7 @@
       </p:sp>
       <p:sp>
         <p:nvSpPr>
-          <p:cNvPr id="143" name="Google Shape;143;p9:notes"/>
+          <p:cNvPr id="144" name="Google Shape;144;p9:notes"/>
           <p:cNvSpPr/>
           <p:nvPr>
             <p:ph idx="2" type="sldImg"/>
@@ -11884,7 +11884,7 @@
   <p:cSld>
     <p:spTree>
       <p:nvGrpSpPr>
-        <p:cNvPr id="153" name="Shape 153"/>
+        <p:cNvPr id="154" name="Shape 154"/>
         <p:cNvGrpSpPr/>
         <p:nvPr/>
       </p:nvGrpSpPr>
@@ -11898,7 +11898,7 @@
       </p:grpSpPr>
       <p:sp>
         <p:nvSpPr>
-          <p:cNvPr id="154" name="Google Shape;154;p22"/>
+          <p:cNvPr id="155" name="Google Shape;155;p22"/>
           <p:cNvSpPr txBox="1"/>
           <p:nvPr/>
         </p:nvSpPr>
@@ -11956,7 +11956,7 @@
       </p:sp>
       <p:cxnSp>
         <p:nvCxnSpPr>
-          <p:cNvPr id="155" name="Google Shape;155;p22"/>
+          <p:cNvPr id="156" name="Google Shape;156;p22"/>
           <p:cNvCxnSpPr/>
           <p:nvPr/>
         </p:nvCxnSpPr>
@@ -11982,7 +11982,7 @@
       </p:cxnSp>
       <p:sp>
         <p:nvSpPr>
-          <p:cNvPr id="156" name="Google Shape;156;p22"/>
+          <p:cNvPr id="157" name="Google Shape;157;p22"/>
           <p:cNvSpPr txBox="1"/>
           <p:nvPr>
             <p:ph idx="12" type="sldNum"/>
@@ -12026,7 +12026,7 @@
       </p:sp>
       <p:sp>
         <p:nvSpPr>
-          <p:cNvPr id="157" name="Google Shape;157;p22"/>
+          <p:cNvPr id="158" name="Google Shape;158;p22"/>
           <p:cNvSpPr txBox="1"/>
           <p:nvPr/>
         </p:nvSpPr>
@@ -14047,6 +14047,424 @@
           </a:p>
         </p:txBody>
       </p:sp>
+      <p:sp>
+        <p:nvSpPr>
+          <p:cNvPr id="120" name="Google Shape;120;p17"/>
+          <p:cNvSpPr txBox="1"/>
+          <p:nvPr/>
+        </p:nvSpPr>
+        <p:spPr>
+          <a:xfrm>
+            <a:off x="397950" y="1154050"/>
+            <a:ext cx="11023200" cy="2986200"/>
+          </a:xfrm>
+          <a:prstGeom prst="rect">
+            <a:avLst/>
+          </a:prstGeom>
+          <a:noFill/>
+          <a:ln>
+            <a:noFill/>
+          </a:ln>
+        </p:spPr>
+        <p:txBody>
+          <a:bodyPr anchorCtr="0" anchor="t" bIns="91425" lIns="91425" spcFirstLastPara="1" rIns="91425" wrap="square" tIns="91425">
+            <a:spAutoFit/>
+          </a:bodyPr>
+          <a:lstStyle/>
+          <a:p>
+            <a:pPr indent="0" lvl="0" marL="0" rtl="0" algn="l">
+              <a:spcBef>
+                <a:spcPts val="0"/>
+              </a:spcBef>
+              <a:spcAft>
+                <a:spcPts val="0"/>
+              </a:spcAft>
+              <a:buClr>
+                <a:schemeClr val="dk1"/>
+              </a:buClr>
+              <a:buSzPts val="1100"/>
+              <a:buFont typeface="Arial"/>
+              <a:buNone/>
+            </a:pPr>
+            <a:r>
+              <a:rPr lang="en-US">
+                <a:latin typeface="Calibri"/>
+                <a:ea typeface="Calibri"/>
+                <a:cs typeface="Calibri"/>
+                <a:sym typeface="Calibri"/>
+              </a:rPr>
+              <a:t>Knapsack (items, weight):</a:t>
+            </a:r>
+            <a:endParaRPr>
+              <a:latin typeface="Calibri"/>
+              <a:ea typeface="Calibri"/>
+              <a:cs typeface="Calibri"/>
+              <a:sym typeface="Calibri"/>
+            </a:endParaRPr>
+          </a:p>
+          <a:p>
+            <a:pPr indent="0" lvl="0" marL="0" rtl="0" algn="l">
+              <a:spcBef>
+                <a:spcPts val="0"/>
+              </a:spcBef>
+              <a:spcAft>
+                <a:spcPts val="0"/>
+              </a:spcAft>
+              <a:buClr>
+                <a:schemeClr val="dk1"/>
+              </a:buClr>
+              <a:buSzPts val="1100"/>
+              <a:buFont typeface="Arial"/>
+              <a:buNone/>
+            </a:pPr>
+            <a:r>
+              <a:rPr lang="en-US">
+                <a:latin typeface="Calibri"/>
+                <a:ea typeface="Calibri"/>
+                <a:cs typeface="Calibri"/>
+                <a:sym typeface="Calibri"/>
+              </a:rPr>
+              <a:t>  Knapsackinator (weights_remain, i_index):</a:t>
+            </a:r>
+            <a:endParaRPr>
+              <a:latin typeface="Calibri"/>
+              <a:ea typeface="Calibri"/>
+              <a:cs typeface="Calibri"/>
+              <a:sym typeface="Calibri"/>
+            </a:endParaRPr>
+          </a:p>
+          <a:p>
+            <a:pPr indent="0" lvl="0" marL="0" rtl="0" algn="l">
+              <a:spcBef>
+                <a:spcPts val="0"/>
+              </a:spcBef>
+              <a:spcAft>
+                <a:spcPts val="0"/>
+              </a:spcAft>
+              <a:buClr>
+                <a:schemeClr val="dk1"/>
+              </a:buClr>
+              <a:buSzPts val="1100"/>
+              <a:buFont typeface="Arial"/>
+              <a:buNone/>
+            </a:pPr>
+            <a:r>
+              <a:rPr lang="en-US">
+                <a:latin typeface="Calibri"/>
+                <a:ea typeface="Calibri"/>
+                <a:cs typeface="Calibri"/>
+                <a:sym typeface="Calibri"/>
+              </a:rPr>
+              <a:t>    if weights_remain is empty or i_index is greater than or equal to the length of the items:</a:t>
+            </a:r>
+            <a:endParaRPr>
+              <a:latin typeface="Calibri"/>
+              <a:ea typeface="Calibri"/>
+              <a:cs typeface="Calibri"/>
+              <a:sym typeface="Calibri"/>
+            </a:endParaRPr>
+          </a:p>
+          <a:p>
+            <a:pPr indent="0" lvl="0" marL="0" rtl="0" algn="l">
+              <a:spcBef>
+                <a:spcPts val="0"/>
+              </a:spcBef>
+              <a:spcAft>
+                <a:spcPts val="0"/>
+              </a:spcAft>
+              <a:buClr>
+                <a:schemeClr val="dk1"/>
+              </a:buClr>
+              <a:buSzPts val="1100"/>
+              <a:buFont typeface="Arial"/>
+              <a:buNone/>
+            </a:pPr>
+            <a:r>
+              <a:rPr lang="en-US">
+                <a:latin typeface="Calibri"/>
+                <a:ea typeface="Calibri"/>
+                <a:cs typeface="Calibri"/>
+                <a:sym typeface="Calibri"/>
+              </a:rPr>
+              <a:t>      return a list containing zero and an empty list</a:t>
+            </a:r>
+            <a:endParaRPr>
+              <a:latin typeface="Calibri"/>
+              <a:ea typeface="Calibri"/>
+              <a:cs typeface="Calibri"/>
+              <a:sym typeface="Calibri"/>
+            </a:endParaRPr>
+          </a:p>
+          <a:p>
+            <a:pPr indent="0" lvl="0" marL="0" rtl="0" algn="l">
+              <a:spcBef>
+                <a:spcPts val="0"/>
+              </a:spcBef>
+              <a:spcAft>
+                <a:spcPts val="0"/>
+              </a:spcAft>
+              <a:buClr>
+                <a:schemeClr val="dk1"/>
+              </a:buClr>
+              <a:buSzPts val="1100"/>
+              <a:buFont typeface="Arial"/>
+              <a:buNone/>
+            </a:pPr>
+            <a:r>
+              <a:rPr lang="en-US">
+                <a:latin typeface="Calibri"/>
+                <a:ea typeface="Calibri"/>
+                <a:cs typeface="Calibri"/>
+                <a:sym typeface="Calibri"/>
+              </a:rPr>
+              <a:t>    with_item &lt;- Knapsackinator (weights_remain - items's weight, i_index + 1)</a:t>
+            </a:r>
+            <a:endParaRPr>
+              <a:latin typeface="Calibri"/>
+              <a:ea typeface="Calibri"/>
+              <a:cs typeface="Calibri"/>
+              <a:sym typeface="Calibri"/>
+            </a:endParaRPr>
+          </a:p>
+          <a:p>
+            <a:pPr indent="0" lvl="0" marL="0" rtl="0" algn="l">
+              <a:spcBef>
+                <a:spcPts val="0"/>
+              </a:spcBef>
+              <a:spcAft>
+                <a:spcPts val="0"/>
+              </a:spcAft>
+              <a:buClr>
+                <a:schemeClr val="dk1"/>
+              </a:buClr>
+              <a:buSzPts val="1100"/>
+              <a:buFont typeface="Arial"/>
+              <a:buNone/>
+            </a:pPr>
+            <a:r>
+              <a:rPr lang="en-US">
+                <a:latin typeface="Calibri"/>
+                <a:ea typeface="Calibri"/>
+                <a:cs typeface="Calibri"/>
+                <a:sym typeface="Calibri"/>
+              </a:rPr>
+              <a:t>    without_item &lt;- Knapsackinator (weights_remain, i_index + 1)</a:t>
+            </a:r>
+            <a:endParaRPr>
+              <a:latin typeface="Calibri"/>
+              <a:ea typeface="Calibri"/>
+              <a:cs typeface="Calibri"/>
+              <a:sym typeface="Calibri"/>
+            </a:endParaRPr>
+          </a:p>
+          <a:p>
+            <a:pPr indent="0" lvl="0" marL="0" rtl="0" algn="l">
+              <a:spcBef>
+                <a:spcPts val="0"/>
+              </a:spcBef>
+              <a:spcAft>
+                <a:spcPts val="0"/>
+              </a:spcAft>
+              <a:buClr>
+                <a:schemeClr val="dk1"/>
+              </a:buClr>
+              <a:buSzPts val="1100"/>
+              <a:buFont typeface="Arial"/>
+              <a:buNone/>
+            </a:pPr>
+            <a:r>
+              <a:rPr lang="en-US">
+                <a:latin typeface="Calibri"/>
+                <a:ea typeface="Calibri"/>
+                <a:cs typeface="Calibri"/>
+                <a:sym typeface="Calibri"/>
+              </a:rPr>
+              <a:t>    add item's value to with_item array</a:t>
+            </a:r>
+            <a:endParaRPr>
+              <a:latin typeface="Calibri"/>
+              <a:ea typeface="Calibri"/>
+              <a:cs typeface="Calibri"/>
+              <a:sym typeface="Calibri"/>
+            </a:endParaRPr>
+          </a:p>
+          <a:p>
+            <a:pPr indent="0" lvl="0" marL="0" rtl="0" algn="l">
+              <a:spcBef>
+                <a:spcPts val="0"/>
+              </a:spcBef>
+              <a:spcAft>
+                <a:spcPts val="0"/>
+              </a:spcAft>
+              <a:buClr>
+                <a:schemeClr val="dk1"/>
+              </a:buClr>
+              <a:buSzPts val="1100"/>
+              <a:buFont typeface="Arial"/>
+              <a:buNone/>
+            </a:pPr>
+            <a:r>
+              <a:rPr lang="en-US">
+                <a:latin typeface="Calibri"/>
+                <a:ea typeface="Calibri"/>
+                <a:cs typeface="Calibri"/>
+                <a:sym typeface="Calibri"/>
+              </a:rPr>
+              <a:t>    check if with_item's value is greater than without_item</a:t>
+            </a:r>
+            <a:endParaRPr>
+              <a:latin typeface="Calibri"/>
+              <a:ea typeface="Calibri"/>
+              <a:cs typeface="Calibri"/>
+              <a:sym typeface="Calibri"/>
+            </a:endParaRPr>
+          </a:p>
+          <a:p>
+            <a:pPr indent="0" lvl="0" marL="0" rtl="0" algn="l">
+              <a:spcBef>
+                <a:spcPts val="0"/>
+              </a:spcBef>
+              <a:spcAft>
+                <a:spcPts val="0"/>
+              </a:spcAft>
+              <a:buClr>
+                <a:schemeClr val="dk1"/>
+              </a:buClr>
+              <a:buSzPts val="1100"/>
+              <a:buFont typeface="Arial"/>
+              <a:buNone/>
+            </a:pPr>
+            <a:r>
+              <a:rPr lang="en-US">
+                <a:latin typeface="Calibri"/>
+                <a:ea typeface="Calibri"/>
+                <a:cs typeface="Calibri"/>
+                <a:sym typeface="Calibri"/>
+              </a:rPr>
+              <a:t>      return with_item</a:t>
+            </a:r>
+            <a:endParaRPr>
+              <a:latin typeface="Calibri"/>
+              <a:ea typeface="Calibri"/>
+              <a:cs typeface="Calibri"/>
+              <a:sym typeface="Calibri"/>
+            </a:endParaRPr>
+          </a:p>
+          <a:p>
+            <a:pPr indent="0" lvl="0" marL="0" rtl="0" algn="l">
+              <a:spcBef>
+                <a:spcPts val="0"/>
+              </a:spcBef>
+              <a:spcAft>
+                <a:spcPts val="0"/>
+              </a:spcAft>
+              <a:buClr>
+                <a:schemeClr val="dk1"/>
+              </a:buClr>
+              <a:buSzPts val="1100"/>
+              <a:buFont typeface="Arial"/>
+              <a:buNone/>
+            </a:pPr>
+            <a:r>
+              <a:rPr lang="en-US">
+                <a:latin typeface="Calibri"/>
+                <a:ea typeface="Calibri"/>
+                <a:cs typeface="Calibri"/>
+                <a:sym typeface="Calibri"/>
+              </a:rPr>
+              <a:t>    else:</a:t>
+            </a:r>
+            <a:endParaRPr>
+              <a:latin typeface="Calibri"/>
+              <a:ea typeface="Calibri"/>
+              <a:cs typeface="Calibri"/>
+              <a:sym typeface="Calibri"/>
+            </a:endParaRPr>
+          </a:p>
+          <a:p>
+            <a:pPr indent="0" lvl="0" marL="0" rtl="0" algn="l">
+              <a:spcBef>
+                <a:spcPts val="0"/>
+              </a:spcBef>
+              <a:spcAft>
+                <a:spcPts val="0"/>
+              </a:spcAft>
+              <a:buClr>
+                <a:schemeClr val="dk1"/>
+              </a:buClr>
+              <a:buSzPts val="1100"/>
+              <a:buFont typeface="Arial"/>
+              <a:buNone/>
+            </a:pPr>
+            <a:r>
+              <a:rPr lang="en-US">
+                <a:latin typeface="Calibri"/>
+                <a:ea typeface="Calibri"/>
+                <a:cs typeface="Calibri"/>
+                <a:sym typeface="Calibri"/>
+              </a:rPr>
+              <a:t>      return without_item</a:t>
+            </a:r>
+            <a:endParaRPr>
+              <a:latin typeface="Calibri"/>
+              <a:ea typeface="Calibri"/>
+              <a:cs typeface="Calibri"/>
+              <a:sym typeface="Calibri"/>
+            </a:endParaRPr>
+          </a:p>
+          <a:p>
+            <a:pPr indent="0" lvl="0" marL="0" rtl="0" algn="l">
+              <a:spcBef>
+                <a:spcPts val="0"/>
+              </a:spcBef>
+              <a:spcAft>
+                <a:spcPts val="0"/>
+              </a:spcAft>
+              <a:buClr>
+                <a:schemeClr val="dk1"/>
+              </a:buClr>
+              <a:buSzPts val="1100"/>
+              <a:buFont typeface="Arial"/>
+              <a:buNone/>
+            </a:pPr>
+            <a:r>
+              <a:rPr lang="en-US">
+                <a:latin typeface="Calibri"/>
+                <a:ea typeface="Calibri"/>
+                <a:cs typeface="Calibri"/>
+                <a:sym typeface="Calibri"/>
+              </a:rPr>
+              <a:t>  return Knapsackinator(weight, 0)</a:t>
+            </a:r>
+            <a:endParaRPr>
+              <a:latin typeface="Calibri"/>
+              <a:ea typeface="Calibri"/>
+              <a:cs typeface="Calibri"/>
+              <a:sym typeface="Calibri"/>
+            </a:endParaRPr>
+          </a:p>
+          <a:p>
+            <a:pPr indent="0" lvl="0" marL="0" rtl="0" algn="l">
+              <a:spcBef>
+                <a:spcPts val="0"/>
+              </a:spcBef>
+              <a:spcAft>
+                <a:spcPts val="0"/>
+              </a:spcAft>
+              <a:buNone/>
+            </a:pPr>
+            <a:r>
+              <a:t/>
+            </a:r>
+            <a:endParaRPr>
+              <a:latin typeface="Calibri"/>
+              <a:ea typeface="Calibri"/>
+              <a:cs typeface="Calibri"/>
+              <a:sym typeface="Calibri"/>
+            </a:endParaRPr>
+          </a:p>
+        </p:txBody>
+      </p:sp>
     </p:spTree>
   </p:cSld>
   <p:clrMapOvr>
@@ -14060,7 +14478,7 @@
   <p:cSld>
     <p:spTree>
       <p:nvGrpSpPr>
-        <p:cNvPr id="123" name="Shape 123"/>
+        <p:cNvPr id="124" name="Shape 124"/>
         <p:cNvGrpSpPr/>
         <p:nvPr/>
       </p:nvGrpSpPr>
@@ -14074,7 +14492,7 @@
       </p:grpSpPr>
       <p:sp>
         <p:nvSpPr>
-          <p:cNvPr id="124" name="Google Shape;124;p18"/>
+          <p:cNvPr id="125" name="Google Shape;125;p18"/>
           <p:cNvSpPr txBox="1"/>
           <p:nvPr/>
         </p:nvSpPr>
@@ -14132,7 +14550,7 @@
       </p:sp>
       <p:cxnSp>
         <p:nvCxnSpPr>
-          <p:cNvPr id="125" name="Google Shape;125;p18"/>
+          <p:cNvPr id="126" name="Google Shape;126;p18"/>
           <p:cNvCxnSpPr/>
           <p:nvPr/>
         </p:nvCxnSpPr>
@@ -14158,7 +14576,7 @@
       </p:cxnSp>
       <p:sp>
         <p:nvSpPr>
-          <p:cNvPr id="126" name="Google Shape;126;p18"/>
+          <p:cNvPr id="127" name="Google Shape;127;p18"/>
           <p:cNvSpPr txBox="1"/>
           <p:nvPr>
             <p:ph idx="12" type="sldNum"/>
@@ -14213,7 +14631,7 @@
   <p:cSld>
     <p:spTree>
       <p:nvGrpSpPr>
-        <p:cNvPr id="130" name="Shape 130"/>
+        <p:cNvPr id="131" name="Shape 131"/>
         <p:cNvGrpSpPr/>
         <p:nvPr/>
       </p:nvGrpSpPr>
@@ -14227,7 +14645,7 @@
       </p:grpSpPr>
       <p:sp>
         <p:nvSpPr>
-          <p:cNvPr id="131" name="Google Shape;131;p19"/>
+          <p:cNvPr id="132" name="Google Shape;132;p19"/>
           <p:cNvSpPr txBox="1"/>
           <p:nvPr/>
         </p:nvSpPr>
@@ -14285,7 +14703,7 @@
       </p:sp>
       <p:cxnSp>
         <p:nvCxnSpPr>
-          <p:cNvPr id="132" name="Google Shape;132;p19"/>
+          <p:cNvPr id="133" name="Google Shape;133;p19"/>
           <p:cNvCxnSpPr/>
           <p:nvPr/>
         </p:nvCxnSpPr>
@@ -14311,7 +14729,7 @@
       </p:cxnSp>
       <p:sp>
         <p:nvSpPr>
-          <p:cNvPr id="133" name="Google Shape;133;p19"/>
+          <p:cNvPr id="134" name="Google Shape;134;p19"/>
           <p:cNvSpPr txBox="1"/>
           <p:nvPr>
             <p:ph idx="12" type="sldNum"/>
@@ -14355,7 +14773,7 @@
       </p:sp>
       <p:sp>
         <p:nvSpPr>
-          <p:cNvPr id="134" name="Google Shape;134;p19"/>
+          <p:cNvPr id="135" name="Google Shape;135;p19"/>
           <p:cNvSpPr txBox="1"/>
           <p:nvPr/>
         </p:nvSpPr>
@@ -14520,7 +14938,7 @@
   <p:cSld>
     <p:spTree>
       <p:nvGrpSpPr>
-        <p:cNvPr id="138" name="Shape 138"/>
+        <p:cNvPr id="139" name="Shape 139"/>
         <p:cNvGrpSpPr/>
         <p:nvPr/>
       </p:nvGrpSpPr>
@@ -14534,7 +14952,7 @@
       </p:grpSpPr>
       <p:sp>
         <p:nvSpPr>
-          <p:cNvPr id="139" name="Google Shape;139;p20"/>
+          <p:cNvPr id="140" name="Google Shape;140;p20"/>
           <p:cNvSpPr txBox="1"/>
           <p:nvPr>
             <p:ph type="ctrTitle"/>
@@ -14586,7 +15004,7 @@
       </p:sp>
       <p:sp>
         <p:nvSpPr>
-          <p:cNvPr id="140" name="Google Shape;140;p20"/>
+          <p:cNvPr id="141" name="Google Shape;141;p20"/>
           <p:cNvSpPr txBox="1"/>
           <p:nvPr>
             <p:ph idx="1" type="subTitle"/>
@@ -14648,7 +15066,7 @@
   <p:cSld>
     <p:spTree>
       <p:nvGrpSpPr>
-        <p:cNvPr id="144" name="Shape 144"/>
+        <p:cNvPr id="145" name="Shape 145"/>
         <p:cNvGrpSpPr/>
         <p:nvPr/>
       </p:nvGrpSpPr>
@@ -14662,7 +15080,7 @@
       </p:grpSpPr>
       <p:sp>
         <p:nvSpPr>
-          <p:cNvPr id="145" name="Google Shape;145;p21"/>
+          <p:cNvPr id="146" name="Google Shape;146;p21"/>
           <p:cNvSpPr txBox="1"/>
           <p:nvPr/>
         </p:nvSpPr>
@@ -14720,7 +15138,7 @@
       </p:sp>
       <p:cxnSp>
         <p:nvCxnSpPr>
-          <p:cNvPr id="146" name="Google Shape;146;p21"/>
+          <p:cNvPr id="147" name="Google Shape;147;p21"/>
           <p:cNvCxnSpPr/>
           <p:nvPr/>
         </p:nvCxnSpPr>
@@ -14746,7 +15164,7 @@
       </p:cxnSp>
       <p:sp>
         <p:nvSpPr>
-          <p:cNvPr id="147" name="Google Shape;147;p21"/>
+          <p:cNvPr id="148" name="Google Shape;148;p21"/>
           <p:cNvSpPr txBox="1"/>
           <p:nvPr>
             <p:ph idx="12" type="sldNum"/>
@@ -14790,7 +15208,7 @@
       </p:sp>
       <p:sp>
         <p:nvSpPr>
-          <p:cNvPr id="148" name="Google Shape;148;p21"/>
+          <p:cNvPr id="149" name="Google Shape;149;p21"/>
           <p:cNvSpPr txBox="1"/>
           <p:nvPr/>
         </p:nvSpPr>
@@ -15003,7 +15421,7 @@
       </p:sp>
       <p:pic>
         <p:nvPicPr>
-          <p:cNvPr id="149" name="Google Shape;149;p21"/>
+          <p:cNvPr id="150" name="Google Shape;150;p21"/>
           <p:cNvPicPr preferRelativeResize="0"/>
           <p:nvPr/>
         </p:nvPicPr>

</xml_diff>

<commit_message>
Adds graph for test input cases.
</commit_message>
<xml_diff>
--- a/approximation_presentation.pptx
+++ b/approximation_presentation.pptx
@@ -1,6 +1,6 @@
 
 <file path=ppt/presentation.xml><?xml version="1.0" encoding="utf-8"?>
-<p:presentation xmlns:a="http://schemas.openxmlformats.org/drawingml/2006/main" xmlns:r="http://schemas.openxmlformats.org/officeDocument/2006/relationships" xmlns:mc="http://schemas.openxmlformats.org/markup-compatibility/2006" xmlns:mv="urn:schemas-microsoft-com:mac:vml" xmlns:p="http://schemas.openxmlformats.org/presentationml/2006/main" xmlns:c="http://schemas.openxmlformats.org/drawingml/2006/chart" xmlns:dgm="http://schemas.openxmlformats.org/drawingml/2006/diagram" xmlns:o="urn:schemas-microsoft-com:office:office" xmlns:v="urn:schemas-microsoft-com:vml" xmlns:pvml="urn:schemas-microsoft-com:office:powerpoint" xmlns:com="http://schemas.openxmlformats.org/drawingml/2006/compatibility" xmlns:p14="http://schemas.microsoft.com/office/powerpoint/2010/main" xmlns:p15="http://schemas.microsoft.com/office/powerpoint/2012/main" xmlns:ahyp="http://schemas.microsoft.com/office/drawing/2018/hyperlinkcolor" autoCompressPictures="0" strictFirstAndLastChars="0" saveSubsetFonts="1">
+<p:presentation xmlns:a="http://schemas.openxmlformats.org/drawingml/2006/main" xmlns:r="http://schemas.openxmlformats.org/officeDocument/2006/relationships" xmlns:mc="http://schemas.openxmlformats.org/markup-compatibility/2006" xmlns:mv="urn:schemas-microsoft-com:mac:vml" xmlns:p="http://schemas.openxmlformats.org/presentationml/2006/main" xmlns:c="http://schemas.openxmlformats.org/drawingml/2006/chart" xmlns:dgm="http://schemas.openxmlformats.org/drawingml/2006/diagram" xmlns:o="urn:schemas-microsoft-com:office:office" xmlns:v="urn:schemas-microsoft-com:vml" xmlns:pvml="urn:schemas-microsoft-com:office:powerpoint" xmlns:com="http://schemas.openxmlformats.org/drawingml/2006/compatibility" xmlns:p14="http://schemas.microsoft.com/office/powerpoint/2010/main" xmlns:p15="http://schemas.microsoft.com/office/powerpoint/2012/main" xmlns:ahyp="http://schemas.microsoft.com/office/drawing/2018/hyperlinkcolor" autoCompressPictures="0" embedTrueTypeFonts="1" strictFirstAndLastChars="0" saveSubsetFonts="1">
   <p:sldMasterIdLst>
     <p:sldMasterId id="2147483659" r:id="rId3"/>
   </p:sldMasterIdLst>
@@ -21,6 +21,15 @@
   </p:sldIdLst>
   <p:sldSz cy="6858000" cx="12192000"/>
   <p:notesSz cx="6858000" cy="9144000"/>
+  <p:embeddedFontLst>
+    <p:embeddedFont>
+      <p:font typeface="Source Code Pro"/>
+      <p:regular r:id="rId15"/>
+      <p:bold r:id="rId16"/>
+      <p:italic r:id="rId17"/>
+      <p:boldItalic r:id="rId18"/>
+    </p:embeddedFont>
+  </p:embeddedFontLst>
   <p:defaultTextStyle>
     <a:defPPr lvl="0" marR="0" rtl="0" algn="l">
       <a:lnSpc>
@@ -783,7 +792,7 @@
   <p:cSld>
     <p:spTree>
       <p:nvGrpSpPr>
-        <p:cNvPr id="151" name="Shape 151"/>
+        <p:cNvPr id="152" name="Shape 152"/>
         <p:cNvGrpSpPr/>
         <p:nvPr/>
       </p:nvGrpSpPr>
@@ -797,7 +806,7 @@
       </p:grpSpPr>
       <p:sp>
         <p:nvSpPr>
-          <p:cNvPr id="152" name="Google Shape;152;g1261d56f1b4_0_10:notes"/>
+          <p:cNvPr id="153" name="Google Shape;153;g1261d56f1b4_0_10:notes"/>
           <p:cNvSpPr txBox="1"/>
           <p:nvPr>
             <p:ph idx="1" type="body"/>
@@ -836,7 +845,7 @@
       </p:sp>
       <p:sp>
         <p:nvSpPr>
-          <p:cNvPr id="153" name="Google Shape;153;g1261d56f1b4_0_10:notes"/>
+          <p:cNvPr id="154" name="Google Shape;154;g1261d56f1b4_0_10:notes"/>
           <p:cNvSpPr/>
           <p:nvPr>
             <p:ph idx="2" type="sldImg"/>
@@ -1476,7 +1485,7 @@
   <p:cSld>
     <p:spTree>
       <p:nvGrpSpPr>
-        <p:cNvPr id="136" name="Shape 136"/>
+        <p:cNvPr id="137" name="Shape 137"/>
         <p:cNvGrpSpPr/>
         <p:nvPr/>
       </p:nvGrpSpPr>
@@ -1490,7 +1499,7 @@
       </p:grpSpPr>
       <p:sp>
         <p:nvSpPr>
-          <p:cNvPr id="137" name="Google Shape;137;p8:notes"/>
+          <p:cNvPr id="138" name="Google Shape;138;p8:notes"/>
           <p:cNvSpPr txBox="1"/>
           <p:nvPr>
             <p:ph idx="1" type="body"/>
@@ -1529,7 +1538,7 @@
       </p:sp>
       <p:sp>
         <p:nvSpPr>
-          <p:cNvPr id="138" name="Google Shape;138;p8:notes"/>
+          <p:cNvPr id="139" name="Google Shape;139;p8:notes"/>
           <p:cNvSpPr/>
           <p:nvPr>
             <p:ph idx="2" type="sldImg"/>
@@ -1575,7 +1584,7 @@
   <p:cSld>
     <p:spTree>
       <p:nvGrpSpPr>
-        <p:cNvPr id="142" name="Shape 142"/>
+        <p:cNvPr id="143" name="Shape 143"/>
         <p:cNvGrpSpPr/>
         <p:nvPr/>
       </p:nvGrpSpPr>
@@ -1589,7 +1598,7 @@
       </p:grpSpPr>
       <p:sp>
         <p:nvSpPr>
-          <p:cNvPr id="143" name="Google Shape;143;p9:notes"/>
+          <p:cNvPr id="144" name="Google Shape;144;p9:notes"/>
           <p:cNvSpPr txBox="1"/>
           <p:nvPr>
             <p:ph idx="1" type="body"/>
@@ -1628,7 +1637,7 @@
       </p:sp>
       <p:sp>
         <p:nvSpPr>
-          <p:cNvPr id="144" name="Google Shape;144;p9:notes"/>
+          <p:cNvPr id="145" name="Google Shape;145;p9:notes"/>
           <p:cNvSpPr/>
           <p:nvPr>
             <p:ph idx="2" type="sldImg"/>
@@ -11884,7 +11893,7 @@
   <p:cSld>
     <p:spTree>
       <p:nvGrpSpPr>
-        <p:cNvPr id="154" name="Shape 154"/>
+        <p:cNvPr id="155" name="Shape 155"/>
         <p:cNvGrpSpPr/>
         <p:nvPr/>
       </p:nvGrpSpPr>
@@ -11898,7 +11907,7 @@
       </p:grpSpPr>
       <p:sp>
         <p:nvSpPr>
-          <p:cNvPr id="155" name="Google Shape;155;p22"/>
+          <p:cNvPr id="156" name="Google Shape;156;p22"/>
           <p:cNvSpPr txBox="1"/>
           <p:nvPr/>
         </p:nvSpPr>
@@ -11956,7 +11965,7 @@
       </p:sp>
       <p:cxnSp>
         <p:nvCxnSpPr>
-          <p:cNvPr id="156" name="Google Shape;156;p22"/>
+          <p:cNvPr id="157" name="Google Shape;157;p22"/>
           <p:cNvCxnSpPr/>
           <p:nvPr/>
         </p:nvCxnSpPr>
@@ -11982,7 +11991,7 @@
       </p:cxnSp>
       <p:sp>
         <p:nvSpPr>
-          <p:cNvPr id="157" name="Google Shape;157;p22"/>
+          <p:cNvPr id="158" name="Google Shape;158;p22"/>
           <p:cNvSpPr txBox="1"/>
           <p:nvPr>
             <p:ph idx="12" type="sldNum"/>
@@ -12026,143 +12035,60 @@
       </p:sp>
       <p:sp>
         <p:nvSpPr>
-          <p:cNvPr id="158" name="Google Shape;158;p22"/>
+          <p:cNvPr id="159" name="Google Shape;159;p22"/>
           <p:cNvSpPr txBox="1"/>
           <p:nvPr/>
         </p:nvSpPr>
         <p:spPr>
           <a:xfrm>
-            <a:off x="2895749" y="1299991"/>
-            <a:ext cx="6400500" cy="4785000"/>
+            <a:off x="2262625" y="1861275"/>
+            <a:ext cx="7330200" cy="3740400"/>
           </a:xfrm>
           <a:prstGeom prst="rect">
             <a:avLst/>
           </a:prstGeom>
-          <a:noFill/>
+          <a:solidFill>
+            <a:schemeClr val="lt2"/>
+          </a:solidFill>
           <a:ln>
             <a:noFill/>
           </a:ln>
         </p:spPr>
         <p:txBody>
-          <a:bodyPr anchorCtr="0" anchor="t" bIns="45700" lIns="91425" spcFirstLastPara="1" rIns="91425" wrap="square" tIns="45700">
-            <a:noAutofit/>
+          <a:bodyPr anchorCtr="0" anchor="t" bIns="91425" lIns="91425" spcFirstLastPara="1" rIns="91425" wrap="square" tIns="91425">
+            <a:spAutoFit/>
           </a:bodyPr>
           <a:lstStyle/>
           <a:p>
-            <a:pPr indent="-342900" lvl="0" marL="342900" marR="0" rtl="0" algn="l">
-              <a:lnSpc>
-                <a:spcPct val="90000"/>
-              </a:lnSpc>
-              <a:spcBef>
-                <a:spcPts val="0"/>
-              </a:spcBef>
-              <a:spcAft>
-                <a:spcPts val="0"/>
-              </a:spcAft>
-              <a:buClr>
-                <a:schemeClr val="dk1"/>
-              </a:buClr>
-              <a:buSzPts val="2400"/>
-              <a:buFont typeface="Arial"/>
-              <a:buChar char="•"/>
+            <a:pPr indent="0" lvl="0" marL="0" rtl="0" algn="l">
+              <a:spcBef>
+                <a:spcPts val="0"/>
+              </a:spcBef>
+              <a:spcAft>
+                <a:spcPts val="0"/>
+              </a:spcAft>
+              <a:buNone/>
             </a:pPr>
             <a:r>
-              <a:rPr lang="en-US" sz="2400">
-                <a:solidFill>
-                  <a:schemeClr val="dk1"/>
-                </a:solidFill>
-                <a:latin typeface="Calibri"/>
-                <a:ea typeface="Calibri"/>
-                <a:cs typeface="Calibri"/>
-                <a:sym typeface="Calibri"/>
+              <a:rPr lang="en-US" sz="2100">
+                <a:latin typeface="Cambria"/>
+                <a:ea typeface="Cambria"/>
+                <a:cs typeface="Cambria"/>
+                <a:sym typeface="Cambria"/>
               </a:rPr>
-              <a:t>We chose a greedy algorithm because it drastically speeds up decisions. We sort and choose the most valuable items first.</a:t>
+              <a:t>max_knapsack (items):</a:t>
             </a:r>
-            <a:endParaRPr/>
-          </a:p>
-          <a:p>
-            <a:pPr indent="-342900" lvl="0" marL="342900" marR="0" rtl="0" algn="l">
-              <a:lnSpc>
-                <a:spcPct val="90000"/>
-              </a:lnSpc>
-              <a:spcBef>
-                <a:spcPts val="1000"/>
-              </a:spcBef>
-              <a:spcAft>
-                <a:spcPts val="0"/>
-              </a:spcAft>
-              <a:buClr>
-                <a:schemeClr val="dk1"/>
-              </a:buClr>
-              <a:buSzPts val="2400"/>
-              <a:buFont typeface="Arial"/>
-              <a:buChar char="•"/>
-            </a:pPr>
-            <a:r>
-              <a:rPr b="0" i="0" lang="en-US" sz="2400" u="none" cap="none" strike="noStrike">
-                <a:solidFill>
-                  <a:schemeClr val="dk1"/>
-                </a:solidFill>
-                <a:latin typeface="Calibri"/>
-                <a:ea typeface="Calibri"/>
-                <a:cs typeface="Calibri"/>
-                <a:sym typeface="Calibri"/>
-              </a:rPr>
-              <a:t>Bounds on its performance: low</a:t>
-            </a:r>
-            <a:r>
-              <a:rPr lang="en-US" sz="2400">
-                <a:solidFill>
-                  <a:schemeClr val="dk1"/>
-                </a:solidFill>
-                <a:latin typeface="Calibri"/>
-                <a:ea typeface="Calibri"/>
-                <a:cs typeface="Calibri"/>
-                <a:sym typeface="Calibri"/>
-              </a:rPr>
-              <a:t>-</a:t>
-            </a:r>
-            <a:r>
-              <a:rPr b="0" i="0" lang="en-US" sz="2400" u="none" cap="none" strike="noStrike">
-                <a:solidFill>
-                  <a:schemeClr val="dk1"/>
-                </a:solidFill>
-                <a:latin typeface="Calibri"/>
-                <a:ea typeface="Calibri"/>
-                <a:cs typeface="Calibri"/>
-                <a:sym typeface="Calibri"/>
-              </a:rPr>
-              <a:t> n</a:t>
-            </a:r>
-            <a:r>
-              <a:rPr lang="en-US" sz="2400">
-                <a:solidFill>
-                  <a:schemeClr val="dk1"/>
-                </a:solidFill>
-                <a:latin typeface="Calibri"/>
-                <a:ea typeface="Calibri"/>
-                <a:cs typeface="Calibri"/>
-                <a:sym typeface="Calibri"/>
-              </a:rPr>
-              <a:t>othing fits in the knapsack because of the weight</a:t>
-            </a:r>
-            <a:endParaRPr sz="2400">
-              <a:solidFill>
-                <a:schemeClr val="dk1"/>
-              </a:solidFill>
-              <a:latin typeface="Calibri"/>
-              <a:ea typeface="Calibri"/>
-              <a:cs typeface="Calibri"/>
-              <a:sym typeface="Calibri"/>
+            <a:endParaRPr sz="2100">
+              <a:latin typeface="Cambria"/>
+              <a:ea typeface="Cambria"/>
+              <a:cs typeface="Cambria"/>
+              <a:sym typeface="Cambria"/>
             </a:endParaRPr>
           </a:p>
           <a:p>
-            <a:pPr indent="0" lvl="0" marL="0" marR="0" rtl="0" algn="l">
-              <a:lnSpc>
-                <a:spcPct val="90000"/>
-              </a:lnSpc>
-              <a:spcBef>
-                <a:spcPts val="1000"/>
+            <a:pPr indent="0" lvl="0" marL="0" rtl="0" algn="l">
+              <a:spcBef>
+                <a:spcPts val="0"/>
               </a:spcBef>
               <a:spcAft>
                 <a:spcPts val="0"/>
@@ -12170,58 +12096,236 @@
               <a:buNone/>
             </a:pPr>
             <a:r>
-              <a:rPr lang="en-US" sz="2400">
-                <a:solidFill>
-                  <a:schemeClr val="dk1"/>
-                </a:solidFill>
-                <a:latin typeface="Calibri"/>
-                <a:ea typeface="Calibri"/>
-                <a:cs typeface="Calibri"/>
-                <a:sym typeface="Calibri"/>
-              </a:rPr>
-              <a:t>high- everything fits in the knapsack and needs to be tested and taken</a:t>
+              <a:t/>
             </a:r>
-            <a:endParaRPr sz="2400">
-              <a:solidFill>
-                <a:schemeClr val="dk1"/>
-              </a:solidFill>
-              <a:latin typeface="Calibri"/>
-              <a:ea typeface="Calibri"/>
-              <a:cs typeface="Calibri"/>
-              <a:sym typeface="Calibri"/>
+            <a:endParaRPr sz="2100">
+              <a:latin typeface="Cambria"/>
+              <a:ea typeface="Cambria"/>
+              <a:cs typeface="Cambria"/>
+              <a:sym typeface="Cambria"/>
             </a:endParaRPr>
           </a:p>
           <a:p>
-            <a:pPr indent="-342900" lvl="0" marL="342900" marR="0" rtl="0" algn="l">
-              <a:lnSpc>
-                <a:spcPct val="90000"/>
-              </a:lnSpc>
-              <a:spcBef>
-                <a:spcPts val="1000"/>
-              </a:spcBef>
-              <a:spcAft>
-                <a:spcPts val="0"/>
-              </a:spcAft>
-              <a:buClr>
-                <a:schemeClr val="dk1"/>
-              </a:buClr>
-              <a:buSzPts val="2400"/>
-              <a:buFont typeface="Arial"/>
-              <a:buChar char="•"/>
+            <a:pPr indent="0" lvl="0" marL="0" rtl="0" algn="l">
+              <a:spcBef>
+                <a:spcPts val="0"/>
+              </a:spcBef>
+              <a:spcAft>
+                <a:spcPts val="0"/>
+              </a:spcAft>
+              <a:buNone/>
             </a:pPr>
             <a:r>
-              <a:rPr b="0" i="0" lang="en-US" sz="2400" u="none" cap="none" strike="noStrike">
-                <a:solidFill>
-                  <a:schemeClr val="dk1"/>
-                </a:solidFill>
-                <a:latin typeface="Calibri"/>
-                <a:ea typeface="Calibri"/>
-                <a:cs typeface="Calibri"/>
-                <a:sym typeface="Calibri"/>
+              <a:rPr lang="en-US" sz="2100">
+                <a:latin typeface="Cambria"/>
+                <a:ea typeface="Cambria"/>
+                <a:cs typeface="Cambria"/>
+                <a:sym typeface="Cambria"/>
               </a:rPr>
-              <a:t>Plot comparing difference in run time and solution quality using your test cases.</a:t>
+              <a:t>	sort items from most valuable per weight unit</a:t>
             </a:r>
-            <a:endParaRPr/>
+            <a:endParaRPr sz="2100">
+              <a:latin typeface="Cambria"/>
+              <a:ea typeface="Cambria"/>
+              <a:cs typeface="Cambria"/>
+              <a:sym typeface="Cambria"/>
+            </a:endParaRPr>
+          </a:p>
+          <a:p>
+            <a:pPr indent="0" lvl="0" marL="0" rtl="0" algn="l">
+              <a:spcBef>
+                <a:spcPts val="0"/>
+              </a:spcBef>
+              <a:spcAft>
+                <a:spcPts val="0"/>
+              </a:spcAft>
+              <a:buNone/>
+            </a:pPr>
+            <a:r>
+              <a:t/>
+            </a:r>
+            <a:endParaRPr sz="2100">
+              <a:latin typeface="Cambria"/>
+              <a:ea typeface="Cambria"/>
+              <a:cs typeface="Cambria"/>
+              <a:sym typeface="Cambria"/>
+            </a:endParaRPr>
+          </a:p>
+          <a:p>
+            <a:pPr indent="0" lvl="0" marL="0" rtl="0" algn="l">
+              <a:spcBef>
+                <a:spcPts val="0"/>
+              </a:spcBef>
+              <a:spcAft>
+                <a:spcPts val="0"/>
+              </a:spcAft>
+              <a:buNone/>
+            </a:pPr>
+            <a:r>
+              <a:rPr lang="en-US" sz="2100">
+                <a:latin typeface="Cambria"/>
+                <a:ea typeface="Cambria"/>
+                <a:cs typeface="Cambria"/>
+                <a:sym typeface="Cambria"/>
+              </a:rPr>
+              <a:t>	while there is still more weight allowed and more items:</a:t>
+            </a:r>
+            <a:endParaRPr sz="2100">
+              <a:latin typeface="Cambria"/>
+              <a:ea typeface="Cambria"/>
+              <a:cs typeface="Cambria"/>
+              <a:sym typeface="Cambria"/>
+            </a:endParaRPr>
+          </a:p>
+          <a:p>
+            <a:pPr indent="0" lvl="0" marL="0" rtl="0" algn="l">
+              <a:spcBef>
+                <a:spcPts val="0"/>
+              </a:spcBef>
+              <a:spcAft>
+                <a:spcPts val="0"/>
+              </a:spcAft>
+              <a:buNone/>
+            </a:pPr>
+            <a:r>
+              <a:t/>
+            </a:r>
+            <a:endParaRPr sz="2100">
+              <a:latin typeface="Cambria"/>
+              <a:ea typeface="Cambria"/>
+              <a:cs typeface="Cambria"/>
+              <a:sym typeface="Cambria"/>
+            </a:endParaRPr>
+          </a:p>
+          <a:p>
+            <a:pPr indent="0" lvl="0" marL="0" rtl="0" algn="l">
+              <a:spcBef>
+                <a:spcPts val="0"/>
+              </a:spcBef>
+              <a:spcAft>
+                <a:spcPts val="0"/>
+              </a:spcAft>
+              <a:buNone/>
+            </a:pPr>
+            <a:r>
+              <a:rPr lang="en-US" sz="2100">
+                <a:latin typeface="Cambria"/>
+                <a:ea typeface="Cambria"/>
+                <a:cs typeface="Cambria"/>
+                <a:sym typeface="Cambria"/>
+              </a:rPr>
+              <a:t>		if item weight &lt;= weight left over:</a:t>
+            </a:r>
+            <a:endParaRPr sz="2100">
+              <a:latin typeface="Cambria"/>
+              <a:ea typeface="Cambria"/>
+              <a:cs typeface="Cambria"/>
+              <a:sym typeface="Cambria"/>
+            </a:endParaRPr>
+          </a:p>
+          <a:p>
+            <a:pPr indent="0" lvl="0" marL="0" rtl="0" algn="l">
+              <a:spcBef>
+                <a:spcPts val="0"/>
+              </a:spcBef>
+              <a:spcAft>
+                <a:spcPts val="0"/>
+              </a:spcAft>
+              <a:buNone/>
+            </a:pPr>
+            <a:r>
+              <a:rPr lang="en-US" sz="2100">
+                <a:latin typeface="Cambria"/>
+                <a:ea typeface="Cambria"/>
+                <a:cs typeface="Cambria"/>
+                <a:sym typeface="Cambria"/>
+              </a:rPr>
+              <a:t>			add to knapsack</a:t>
+            </a:r>
+            <a:endParaRPr sz="2100">
+              <a:latin typeface="Cambria"/>
+              <a:ea typeface="Cambria"/>
+              <a:cs typeface="Cambria"/>
+              <a:sym typeface="Cambria"/>
+            </a:endParaRPr>
+          </a:p>
+          <a:p>
+            <a:pPr indent="0" lvl="0" marL="0" rtl="0" algn="l">
+              <a:spcBef>
+                <a:spcPts val="0"/>
+              </a:spcBef>
+              <a:spcAft>
+                <a:spcPts val="0"/>
+              </a:spcAft>
+              <a:buNone/>
+            </a:pPr>
+            <a:r>
+              <a:rPr lang="en-US" sz="2100">
+                <a:latin typeface="Cambria"/>
+                <a:ea typeface="Cambria"/>
+                <a:cs typeface="Cambria"/>
+                <a:sym typeface="Cambria"/>
+              </a:rPr>
+              <a:t>			subtract weight item weight from remaining</a:t>
+            </a:r>
+            <a:endParaRPr sz="2100">
+              <a:latin typeface="Cambria"/>
+              <a:ea typeface="Cambria"/>
+              <a:cs typeface="Cambria"/>
+              <a:sym typeface="Cambria"/>
+            </a:endParaRPr>
+          </a:p>
+          <a:p>
+            <a:pPr indent="0" lvl="0" marL="0" rtl="0" algn="l">
+              <a:spcBef>
+                <a:spcPts val="0"/>
+              </a:spcBef>
+              <a:spcAft>
+                <a:spcPts val="0"/>
+              </a:spcAft>
+              <a:buNone/>
+            </a:pPr>
+            <a:r>
+              <a:rPr lang="en-US" sz="2100">
+                <a:latin typeface="Cambria"/>
+                <a:ea typeface="Cambria"/>
+                <a:cs typeface="Cambria"/>
+                <a:sym typeface="Cambria"/>
+              </a:rPr>
+              <a:t>	</a:t>
+            </a:r>
+            <a:endParaRPr sz="2100">
+              <a:latin typeface="Cambria"/>
+              <a:ea typeface="Cambria"/>
+              <a:cs typeface="Cambria"/>
+              <a:sym typeface="Cambria"/>
+            </a:endParaRPr>
+          </a:p>
+          <a:p>
+            <a:pPr indent="457200" lvl="0" marL="0" rtl="0" algn="l">
+              <a:spcBef>
+                <a:spcPts val="0"/>
+              </a:spcBef>
+              <a:spcAft>
+                <a:spcPts val="0"/>
+              </a:spcAft>
+              <a:buNone/>
+            </a:pPr>
+            <a:r>
+              <a:rPr lang="en-US" sz="2100">
+                <a:latin typeface="Cambria"/>
+                <a:ea typeface="Cambria"/>
+                <a:cs typeface="Cambria"/>
+                <a:sym typeface="Cambria"/>
+              </a:rPr>
+              <a:t>return item list</a:t>
+            </a:r>
+            <a:endParaRPr sz="2100">
+              <a:latin typeface="Cambria"/>
+              <a:ea typeface="Cambria"/>
+              <a:cs typeface="Cambria"/>
+              <a:sym typeface="Cambria"/>
+            </a:endParaRPr>
           </a:p>
         </p:txBody>
       </p:sp>
@@ -14056,12 +14160,14 @@
         <p:spPr>
           <a:xfrm>
             <a:off x="397950" y="1154050"/>
-            <a:ext cx="11023200" cy="2986200"/>
+            <a:ext cx="11023200" cy="3801900"/>
           </a:xfrm>
           <a:prstGeom prst="rect">
             <a:avLst/>
           </a:prstGeom>
-          <a:noFill/>
+          <a:solidFill>
+            <a:schemeClr val="lt2"/>
+          </a:solidFill>
           <a:ln>
             <a:noFill/>
           </a:ln>
@@ -14087,19 +14193,19 @@
               <a:buNone/>
             </a:pPr>
             <a:r>
-              <a:rPr lang="en-US">
-                <a:latin typeface="Calibri"/>
-                <a:ea typeface="Calibri"/>
-                <a:cs typeface="Calibri"/>
-                <a:sym typeface="Calibri"/>
+              <a:rPr lang="en-US" sz="1700">
+                <a:latin typeface="Source Code Pro"/>
+                <a:ea typeface="Source Code Pro"/>
+                <a:cs typeface="Source Code Pro"/>
+                <a:sym typeface="Source Code Pro"/>
               </a:rPr>
               <a:t>Knapsack (items, weight):</a:t>
             </a:r>
-            <a:endParaRPr>
-              <a:latin typeface="Calibri"/>
-              <a:ea typeface="Calibri"/>
-              <a:cs typeface="Calibri"/>
-              <a:sym typeface="Calibri"/>
+            <a:endParaRPr sz="1700">
+              <a:latin typeface="Source Code Pro"/>
+              <a:ea typeface="Source Code Pro"/>
+              <a:cs typeface="Source Code Pro"/>
+              <a:sym typeface="Source Code Pro"/>
             </a:endParaRPr>
           </a:p>
           <a:p>
@@ -14118,19 +14224,19 @@
               <a:buNone/>
             </a:pPr>
             <a:r>
-              <a:rPr lang="en-US">
-                <a:latin typeface="Calibri"/>
-                <a:ea typeface="Calibri"/>
-                <a:cs typeface="Calibri"/>
-                <a:sym typeface="Calibri"/>
+              <a:rPr lang="en-US" sz="1700">
+                <a:latin typeface="Source Code Pro"/>
+                <a:ea typeface="Source Code Pro"/>
+                <a:cs typeface="Source Code Pro"/>
+                <a:sym typeface="Source Code Pro"/>
               </a:rPr>
               <a:t>  Knapsackinator (weights_remain, i_index):</a:t>
             </a:r>
-            <a:endParaRPr>
-              <a:latin typeface="Calibri"/>
-              <a:ea typeface="Calibri"/>
-              <a:cs typeface="Calibri"/>
-              <a:sym typeface="Calibri"/>
+            <a:endParaRPr sz="1700">
+              <a:latin typeface="Source Code Pro"/>
+              <a:ea typeface="Source Code Pro"/>
+              <a:cs typeface="Source Code Pro"/>
+              <a:sym typeface="Source Code Pro"/>
             </a:endParaRPr>
           </a:p>
           <a:p>
@@ -14149,19 +14255,19 @@
               <a:buNone/>
             </a:pPr>
             <a:r>
-              <a:rPr lang="en-US">
-                <a:latin typeface="Calibri"/>
-                <a:ea typeface="Calibri"/>
-                <a:cs typeface="Calibri"/>
-                <a:sym typeface="Calibri"/>
+              <a:rPr lang="en-US" sz="1700">
+                <a:latin typeface="Source Code Pro"/>
+                <a:ea typeface="Source Code Pro"/>
+                <a:cs typeface="Source Code Pro"/>
+                <a:sym typeface="Source Code Pro"/>
               </a:rPr>
-              <a:t>    if weights_remain is empty or i_index is greater than or equal to the length of the items:</a:t>
+              <a:t>    check if weights_remain is empty or i_index is greater than or equal to the length of the items</a:t>
             </a:r>
-            <a:endParaRPr>
-              <a:latin typeface="Calibri"/>
-              <a:ea typeface="Calibri"/>
-              <a:cs typeface="Calibri"/>
-              <a:sym typeface="Calibri"/>
+            <a:endParaRPr sz="1700">
+              <a:latin typeface="Source Code Pro"/>
+              <a:ea typeface="Source Code Pro"/>
+              <a:cs typeface="Source Code Pro"/>
+              <a:sym typeface="Source Code Pro"/>
             </a:endParaRPr>
           </a:p>
           <a:p>
@@ -14180,19 +14286,19 @@
               <a:buNone/>
             </a:pPr>
             <a:r>
-              <a:rPr lang="en-US">
-                <a:latin typeface="Calibri"/>
-                <a:ea typeface="Calibri"/>
-                <a:cs typeface="Calibri"/>
-                <a:sym typeface="Calibri"/>
+              <a:rPr lang="en-US" sz="1700">
+                <a:latin typeface="Source Code Pro"/>
+                <a:ea typeface="Source Code Pro"/>
+                <a:cs typeface="Source Code Pro"/>
+                <a:sym typeface="Source Code Pro"/>
               </a:rPr>
-              <a:t>      return a list containing zero and an empty list</a:t>
+              <a:t>      	return a list containing zero and an empty list</a:t>
             </a:r>
-            <a:endParaRPr>
-              <a:latin typeface="Calibri"/>
-              <a:ea typeface="Calibri"/>
-              <a:cs typeface="Calibri"/>
-              <a:sym typeface="Calibri"/>
+            <a:endParaRPr sz="1700">
+              <a:latin typeface="Source Code Pro"/>
+              <a:ea typeface="Source Code Pro"/>
+              <a:cs typeface="Source Code Pro"/>
+              <a:sym typeface="Source Code Pro"/>
             </a:endParaRPr>
           </a:p>
           <a:p>
@@ -14211,19 +14317,19 @@
               <a:buNone/>
             </a:pPr>
             <a:r>
-              <a:rPr lang="en-US">
-                <a:latin typeface="Calibri"/>
-                <a:ea typeface="Calibri"/>
-                <a:cs typeface="Calibri"/>
-                <a:sym typeface="Calibri"/>
+              <a:rPr lang="en-US" sz="1700">
+                <a:latin typeface="Source Code Pro"/>
+                <a:ea typeface="Source Code Pro"/>
+                <a:cs typeface="Source Code Pro"/>
+                <a:sym typeface="Source Code Pro"/>
               </a:rPr>
               <a:t>    with_item &lt;- Knapsackinator (weights_remain - items's weight, i_index + 1)</a:t>
             </a:r>
-            <a:endParaRPr>
-              <a:latin typeface="Calibri"/>
-              <a:ea typeface="Calibri"/>
-              <a:cs typeface="Calibri"/>
-              <a:sym typeface="Calibri"/>
+            <a:endParaRPr sz="1700">
+              <a:latin typeface="Source Code Pro"/>
+              <a:ea typeface="Source Code Pro"/>
+              <a:cs typeface="Source Code Pro"/>
+              <a:sym typeface="Source Code Pro"/>
             </a:endParaRPr>
           </a:p>
           <a:p>
@@ -14242,19 +14348,19 @@
               <a:buNone/>
             </a:pPr>
             <a:r>
-              <a:rPr lang="en-US">
-                <a:latin typeface="Calibri"/>
-                <a:ea typeface="Calibri"/>
-                <a:cs typeface="Calibri"/>
-                <a:sym typeface="Calibri"/>
+              <a:rPr lang="en-US" sz="1700">
+                <a:latin typeface="Source Code Pro"/>
+                <a:ea typeface="Source Code Pro"/>
+                <a:cs typeface="Source Code Pro"/>
+                <a:sym typeface="Source Code Pro"/>
               </a:rPr>
               <a:t>    without_item &lt;- Knapsackinator (weights_remain, i_index + 1)</a:t>
             </a:r>
-            <a:endParaRPr>
-              <a:latin typeface="Calibri"/>
-              <a:ea typeface="Calibri"/>
-              <a:cs typeface="Calibri"/>
-              <a:sym typeface="Calibri"/>
+            <a:endParaRPr sz="1700">
+              <a:latin typeface="Source Code Pro"/>
+              <a:ea typeface="Source Code Pro"/>
+              <a:cs typeface="Source Code Pro"/>
+              <a:sym typeface="Source Code Pro"/>
             </a:endParaRPr>
           </a:p>
           <a:p>
@@ -14273,19 +14379,19 @@
               <a:buNone/>
             </a:pPr>
             <a:r>
-              <a:rPr lang="en-US">
-                <a:latin typeface="Calibri"/>
-                <a:ea typeface="Calibri"/>
-                <a:cs typeface="Calibri"/>
-                <a:sym typeface="Calibri"/>
+              <a:rPr lang="en-US" sz="1700">
+                <a:latin typeface="Source Code Pro"/>
+                <a:ea typeface="Source Code Pro"/>
+                <a:cs typeface="Source Code Pro"/>
+                <a:sym typeface="Source Code Pro"/>
               </a:rPr>
               <a:t>    add item's value to with_item array</a:t>
             </a:r>
-            <a:endParaRPr>
-              <a:latin typeface="Calibri"/>
-              <a:ea typeface="Calibri"/>
-              <a:cs typeface="Calibri"/>
-              <a:sym typeface="Calibri"/>
+            <a:endParaRPr sz="1700">
+              <a:latin typeface="Source Code Pro"/>
+              <a:ea typeface="Source Code Pro"/>
+              <a:cs typeface="Source Code Pro"/>
+              <a:sym typeface="Source Code Pro"/>
             </a:endParaRPr>
           </a:p>
           <a:p>
@@ -14304,19 +14410,19 @@
               <a:buNone/>
             </a:pPr>
             <a:r>
-              <a:rPr lang="en-US">
-                <a:latin typeface="Calibri"/>
-                <a:ea typeface="Calibri"/>
-                <a:cs typeface="Calibri"/>
-                <a:sym typeface="Calibri"/>
+              <a:rPr lang="en-US" sz="1700">
+                <a:latin typeface="Source Code Pro"/>
+                <a:ea typeface="Source Code Pro"/>
+                <a:cs typeface="Source Code Pro"/>
+                <a:sym typeface="Source Code Pro"/>
               </a:rPr>
               <a:t>    check if with_item's value is greater than without_item</a:t>
             </a:r>
-            <a:endParaRPr>
-              <a:latin typeface="Calibri"/>
-              <a:ea typeface="Calibri"/>
-              <a:cs typeface="Calibri"/>
-              <a:sym typeface="Calibri"/>
+            <a:endParaRPr sz="1700">
+              <a:latin typeface="Source Code Pro"/>
+              <a:ea typeface="Source Code Pro"/>
+              <a:cs typeface="Source Code Pro"/>
+              <a:sym typeface="Source Code Pro"/>
             </a:endParaRPr>
           </a:p>
           <a:p>
@@ -14335,19 +14441,19 @@
               <a:buNone/>
             </a:pPr>
             <a:r>
-              <a:rPr lang="en-US">
-                <a:latin typeface="Calibri"/>
-                <a:ea typeface="Calibri"/>
-                <a:cs typeface="Calibri"/>
-                <a:sym typeface="Calibri"/>
+              <a:rPr lang="en-US" sz="1700">
+                <a:latin typeface="Source Code Pro"/>
+                <a:ea typeface="Source Code Pro"/>
+                <a:cs typeface="Source Code Pro"/>
+                <a:sym typeface="Source Code Pro"/>
               </a:rPr>
-              <a:t>      return with_item</a:t>
+              <a:t>      	return with_item</a:t>
             </a:r>
-            <a:endParaRPr>
-              <a:latin typeface="Calibri"/>
-              <a:ea typeface="Calibri"/>
-              <a:cs typeface="Calibri"/>
-              <a:sym typeface="Calibri"/>
+            <a:endParaRPr sz="1700">
+              <a:latin typeface="Source Code Pro"/>
+              <a:ea typeface="Source Code Pro"/>
+              <a:cs typeface="Source Code Pro"/>
+              <a:sym typeface="Source Code Pro"/>
             </a:endParaRPr>
           </a:p>
           <a:p>
@@ -14366,19 +14472,19 @@
               <a:buNone/>
             </a:pPr>
             <a:r>
-              <a:rPr lang="en-US">
-                <a:latin typeface="Calibri"/>
-                <a:ea typeface="Calibri"/>
-                <a:cs typeface="Calibri"/>
-                <a:sym typeface="Calibri"/>
+              <a:rPr lang="en-US" sz="1700">
+                <a:latin typeface="Source Code Pro"/>
+                <a:ea typeface="Source Code Pro"/>
+                <a:cs typeface="Source Code Pro"/>
+                <a:sym typeface="Source Code Pro"/>
               </a:rPr>
               <a:t>    else:</a:t>
             </a:r>
-            <a:endParaRPr>
-              <a:latin typeface="Calibri"/>
-              <a:ea typeface="Calibri"/>
-              <a:cs typeface="Calibri"/>
-              <a:sym typeface="Calibri"/>
+            <a:endParaRPr sz="1700">
+              <a:latin typeface="Source Code Pro"/>
+              <a:ea typeface="Source Code Pro"/>
+              <a:cs typeface="Source Code Pro"/>
+              <a:sym typeface="Source Code Pro"/>
             </a:endParaRPr>
           </a:p>
           <a:p>
@@ -14397,19 +14503,19 @@
               <a:buNone/>
             </a:pPr>
             <a:r>
-              <a:rPr lang="en-US">
-                <a:latin typeface="Calibri"/>
-                <a:ea typeface="Calibri"/>
-                <a:cs typeface="Calibri"/>
-                <a:sym typeface="Calibri"/>
+              <a:rPr lang="en-US" sz="1700">
+                <a:latin typeface="Source Code Pro"/>
+                <a:ea typeface="Source Code Pro"/>
+                <a:cs typeface="Source Code Pro"/>
+                <a:sym typeface="Source Code Pro"/>
               </a:rPr>
-              <a:t>      return without_item</a:t>
+              <a:t>      	return without_item</a:t>
             </a:r>
-            <a:endParaRPr>
-              <a:latin typeface="Calibri"/>
-              <a:ea typeface="Calibri"/>
-              <a:cs typeface="Calibri"/>
-              <a:sym typeface="Calibri"/>
+            <a:endParaRPr sz="1700">
+              <a:latin typeface="Source Code Pro"/>
+              <a:ea typeface="Source Code Pro"/>
+              <a:cs typeface="Source Code Pro"/>
+              <a:sym typeface="Source Code Pro"/>
             </a:endParaRPr>
           </a:p>
           <a:p>
@@ -14428,19 +14534,22 @@
               <a:buNone/>
             </a:pPr>
             <a:r>
-              <a:rPr lang="en-US">
-                <a:latin typeface="Calibri"/>
-                <a:ea typeface="Calibri"/>
-                <a:cs typeface="Calibri"/>
-                <a:sym typeface="Calibri"/>
+              <a:rPr lang="en-US" sz="1700">
+                <a:latin typeface="Source Code Pro"/>
+                <a:ea typeface="Source Code Pro"/>
+                <a:cs typeface="Source Code Pro"/>
+                <a:sym typeface="Source Code Pro"/>
               </a:rPr>
               <a:t>  return Knapsackinator(weight, 0)</a:t>
             </a:r>
-            <a:endParaRPr>
-              <a:latin typeface="Calibri"/>
-              <a:ea typeface="Calibri"/>
-              <a:cs typeface="Calibri"/>
-              <a:sym typeface="Calibri"/>
+            <a:endParaRPr sz="1700">
+              <a:highlight>
+                <a:srgbClr val="B7B7B7"/>
+              </a:highlight>
+              <a:latin typeface="Source Code Pro"/>
+              <a:ea typeface="Source Code Pro"/>
+              <a:cs typeface="Source Code Pro"/>
+              <a:sym typeface="Source Code Pro"/>
             </a:endParaRPr>
           </a:p>
           <a:p>
@@ -14779,8 +14888,8 @@
         </p:nvSpPr>
         <p:spPr>
           <a:xfrm>
-            <a:off x="447447" y="968660"/>
-            <a:ext cx="10726605" cy="2082761"/>
+            <a:off x="447450" y="968634"/>
+            <a:ext cx="10726500" cy="5387700"/>
           </a:xfrm>
           <a:prstGeom prst="rect">
             <a:avLst/>
@@ -14921,10 +15030,108 @@
               </a:rPr>
               <a:t>Plot of the run time of your program as you increase the input size.  You MUST run your program on inputs that cause your program to run more than 20 minutes.</a:t>
             </a:r>
-            <a:endParaRPr/>
+            <a:endParaRPr b="0" i="0" sz="2400" u="none" cap="none" strike="noStrike">
+              <a:solidFill>
+                <a:schemeClr val="dk1"/>
+              </a:solidFill>
+              <a:latin typeface="Calibri"/>
+              <a:ea typeface="Calibri"/>
+              <a:cs typeface="Calibri"/>
+              <a:sym typeface="Calibri"/>
+            </a:endParaRPr>
+          </a:p>
+          <a:p>
+            <a:pPr indent="0" lvl="0" marL="0" marR="0" rtl="0" algn="l">
+              <a:lnSpc>
+                <a:spcPct val="90000"/>
+              </a:lnSpc>
+              <a:spcBef>
+                <a:spcPts val="1000"/>
+              </a:spcBef>
+              <a:spcAft>
+                <a:spcPts val="0"/>
+              </a:spcAft>
+              <a:buClr>
+                <a:schemeClr val="dk1"/>
+              </a:buClr>
+              <a:buSzPts val="2400"/>
+              <a:buFont typeface="Arial"/>
+              <a:buNone/>
+            </a:pPr>
+            <a:r>
+              <a:t/>
+            </a:r>
+            <a:endParaRPr sz="2400">
+              <a:solidFill>
+                <a:schemeClr val="dk1"/>
+              </a:solidFill>
+              <a:latin typeface="Calibri"/>
+              <a:ea typeface="Calibri"/>
+              <a:cs typeface="Calibri"/>
+              <a:sym typeface="Calibri"/>
+            </a:endParaRPr>
+          </a:p>
+          <a:p>
+            <a:pPr indent="0" lvl="0" marL="0" marR="0" rtl="0" algn="l">
+              <a:lnSpc>
+                <a:spcPct val="90000"/>
+              </a:lnSpc>
+              <a:spcBef>
+                <a:spcPts val="1000"/>
+              </a:spcBef>
+              <a:spcAft>
+                <a:spcPts val="0"/>
+              </a:spcAft>
+              <a:buClr>
+                <a:schemeClr val="dk1"/>
+              </a:buClr>
+              <a:buSzPts val="2400"/>
+              <a:buFont typeface="Arial"/>
+              <a:buNone/>
+            </a:pPr>
+            <a:r>
+              <a:t/>
+            </a:r>
+            <a:endParaRPr sz="2400">
+              <a:solidFill>
+                <a:schemeClr val="dk1"/>
+              </a:solidFill>
+              <a:latin typeface="Calibri"/>
+              <a:ea typeface="Calibri"/>
+              <a:cs typeface="Calibri"/>
+              <a:sym typeface="Calibri"/>
+            </a:endParaRPr>
           </a:p>
         </p:txBody>
       </p:sp>
+      <p:pic>
+        <p:nvPicPr>
+          <p:cNvPr id="136" name="Google Shape;136;p19"/>
+          <p:cNvPicPr preferRelativeResize="0"/>
+          <p:nvPr/>
+        </p:nvPicPr>
+        <p:blipFill>
+          <a:blip r:embed="rId3">
+            <a:alphaModFix/>
+          </a:blip>
+          <a:stretch>
+            <a:fillRect/>
+          </a:stretch>
+        </p:blipFill>
+        <p:spPr>
+          <a:xfrm>
+            <a:off x="3474275" y="3216825"/>
+            <a:ext cx="4672850" cy="3504651"/>
+          </a:xfrm>
+          <a:prstGeom prst="rect">
+            <a:avLst/>
+          </a:prstGeom>
+          <a:noFill/>
+          <a:ln>
+            <a:noFill/>
+          </a:ln>
+        </p:spPr>
+      </p:pic>
     </p:spTree>
   </p:cSld>
   <p:clrMapOvr>
@@ -14938,7 +15145,7 @@
   <p:cSld>
     <p:spTree>
       <p:nvGrpSpPr>
-        <p:cNvPr id="139" name="Shape 139"/>
+        <p:cNvPr id="140" name="Shape 140"/>
         <p:cNvGrpSpPr/>
         <p:nvPr/>
       </p:nvGrpSpPr>
@@ -14952,7 +15159,7 @@
       </p:grpSpPr>
       <p:sp>
         <p:nvSpPr>
-          <p:cNvPr id="140" name="Google Shape;140;p20"/>
+          <p:cNvPr id="141" name="Google Shape;141;p20"/>
           <p:cNvSpPr txBox="1"/>
           <p:nvPr>
             <p:ph type="ctrTitle"/>
@@ -15004,7 +15211,7 @@
       </p:sp>
       <p:sp>
         <p:nvSpPr>
-          <p:cNvPr id="141" name="Google Shape;141;p20"/>
+          <p:cNvPr id="142" name="Google Shape;142;p20"/>
           <p:cNvSpPr txBox="1"/>
           <p:nvPr>
             <p:ph idx="1" type="subTitle"/>
@@ -15066,7 +15273,7 @@
   <p:cSld>
     <p:spTree>
       <p:nvGrpSpPr>
-        <p:cNvPr id="145" name="Shape 145"/>
+        <p:cNvPr id="146" name="Shape 146"/>
         <p:cNvGrpSpPr/>
         <p:nvPr/>
       </p:nvGrpSpPr>
@@ -15080,7 +15287,7 @@
       </p:grpSpPr>
       <p:sp>
         <p:nvSpPr>
-          <p:cNvPr id="146" name="Google Shape;146;p21"/>
+          <p:cNvPr id="147" name="Google Shape;147;p21"/>
           <p:cNvSpPr txBox="1"/>
           <p:nvPr/>
         </p:nvSpPr>
@@ -15138,7 +15345,7 @@
       </p:sp>
       <p:cxnSp>
         <p:nvCxnSpPr>
-          <p:cNvPr id="147" name="Google Shape;147;p21"/>
+          <p:cNvPr id="148" name="Google Shape;148;p21"/>
           <p:cNvCxnSpPr/>
           <p:nvPr/>
         </p:nvCxnSpPr>
@@ -15164,7 +15371,7 @@
       </p:cxnSp>
       <p:sp>
         <p:nvSpPr>
-          <p:cNvPr id="148" name="Google Shape;148;p21"/>
+          <p:cNvPr id="149" name="Google Shape;149;p21"/>
           <p:cNvSpPr txBox="1"/>
           <p:nvPr>
             <p:ph idx="12" type="sldNum"/>
@@ -15208,14 +15415,14 @@
       </p:sp>
       <p:sp>
         <p:nvSpPr>
-          <p:cNvPr id="149" name="Google Shape;149;p21"/>
+          <p:cNvPr id="150" name="Google Shape;150;p21"/>
           <p:cNvSpPr txBox="1"/>
           <p:nvPr/>
         </p:nvSpPr>
         <p:spPr>
           <a:xfrm>
-            <a:off x="447447" y="968660"/>
-            <a:ext cx="10726605" cy="2575921"/>
+            <a:off x="447450" y="968650"/>
+            <a:ext cx="10726500" cy="3126600"/>
           </a:xfrm>
           <a:prstGeom prst="rect">
             <a:avLst/>
@@ -15272,74 +15479,6 @@
               </a:rPr>
               <a:t>algorithm because it drastically speeds up decisions. We sort and choose the most valuable items first.</a:t>
             </a:r>
-            <a:endParaRPr/>
-          </a:p>
-          <a:p>
-            <a:pPr indent="-342900" lvl="0" marL="342900" marR="0" rtl="0" algn="l">
-              <a:lnSpc>
-                <a:spcPct val="90000"/>
-              </a:lnSpc>
-              <a:spcBef>
-                <a:spcPts val="1000"/>
-              </a:spcBef>
-              <a:spcAft>
-                <a:spcPts val="0"/>
-              </a:spcAft>
-              <a:buClr>
-                <a:schemeClr val="dk1"/>
-              </a:buClr>
-              <a:buSzPts val="2400"/>
-              <a:buFont typeface="Arial"/>
-              <a:buChar char="•"/>
-            </a:pPr>
-            <a:r>
-              <a:rPr b="0" i="0" lang="en-US" sz="2400" u="none" cap="none" strike="noStrike">
-                <a:solidFill>
-                  <a:schemeClr val="dk1"/>
-                </a:solidFill>
-                <a:latin typeface="Calibri"/>
-                <a:ea typeface="Calibri"/>
-                <a:cs typeface="Calibri"/>
-                <a:sym typeface="Calibri"/>
-              </a:rPr>
-              <a:t>Bounds on its performance: low</a:t>
-            </a:r>
-            <a:r>
-              <a:rPr lang="en-US" sz="2400">
-                <a:solidFill>
-                  <a:schemeClr val="dk1"/>
-                </a:solidFill>
-                <a:latin typeface="Calibri"/>
-                <a:ea typeface="Calibri"/>
-                <a:cs typeface="Calibri"/>
-                <a:sym typeface="Calibri"/>
-              </a:rPr>
-              <a:t>-</a:t>
-            </a:r>
-            <a:r>
-              <a:rPr b="0" i="0" lang="en-US" sz="2400" u="none" cap="none" strike="noStrike">
-                <a:solidFill>
-                  <a:schemeClr val="dk1"/>
-                </a:solidFill>
-                <a:latin typeface="Calibri"/>
-                <a:ea typeface="Calibri"/>
-                <a:cs typeface="Calibri"/>
-                <a:sym typeface="Calibri"/>
-              </a:rPr>
-              <a:t> n</a:t>
-            </a:r>
-            <a:r>
-              <a:rPr lang="en-US" sz="2400">
-                <a:solidFill>
-                  <a:schemeClr val="dk1"/>
-                </a:solidFill>
-                <a:latin typeface="Calibri"/>
-                <a:ea typeface="Calibri"/>
-                <a:cs typeface="Calibri"/>
-                <a:sym typeface="Calibri"/>
-              </a:rPr>
-              <a:t>othing fits in the knapsack because of the weight</a:t>
-            </a:r>
             <a:endParaRPr sz="2400">
               <a:solidFill>
                 <a:schemeClr val="dk1"/>
@@ -15421,7 +15560,7 @@
       </p:sp>
       <p:pic>
         <p:nvPicPr>
-          <p:cNvPr id="150" name="Google Shape;150;p21"/>
+          <p:cNvPr id="151" name="Google Shape;151;p21"/>
           <p:cNvPicPr preferRelativeResize="0"/>
           <p:nvPr/>
         </p:nvPicPr>
@@ -15434,7 +15573,7 @@
         </p:blipFill>
         <p:spPr>
           <a:xfrm>
-            <a:off x="2582300" y="5065725"/>
+            <a:off x="2492600" y="4542125"/>
             <a:ext cx="6636300" cy="1655750"/>
           </a:xfrm>
           <a:prstGeom prst="rect">

</xml_diff>